<commit_message>
Videos adding into presentation
</commit_message>
<xml_diff>
--- a/Documents/DavesTopMusic.pptx
+++ b/Documents/DavesTopMusic.pptx
@@ -5,15 +5,21 @@
     <p:sldMasterId id="2147483648" r:id="rId1"/>
   </p:sldMasterIdLst>
   <p:notesMasterIdLst>
-    <p:notesMasterId r:id="rId8"/>
+    <p:notesMasterId r:id="rId14"/>
   </p:notesMasterIdLst>
   <p:sldIdLst>
     <p:sldId id="256" r:id="rId2"/>
     <p:sldId id="260" r:id="rId3"/>
     <p:sldId id="261" r:id="rId4"/>
-    <p:sldId id="258" r:id="rId5"/>
-    <p:sldId id="259" r:id="rId6"/>
-    <p:sldId id="257" r:id="rId7"/>
+    <p:sldId id="262" r:id="rId5"/>
+    <p:sldId id="258" r:id="rId6"/>
+    <p:sldId id="259" r:id="rId7"/>
+    <p:sldId id="263" r:id="rId8"/>
+    <p:sldId id="264" r:id="rId9"/>
+    <p:sldId id="257" r:id="rId10"/>
+    <p:sldId id="265" r:id="rId11"/>
+    <p:sldId id="266" r:id="rId12"/>
+    <p:sldId id="267" r:id="rId13"/>
   </p:sldIdLst>
   <p:sldSz cx="12192000" cy="6858000"/>
   <p:notesSz cx="6858000" cy="9144000"/>
@@ -205,7 +211,7 @@
           <a:p>
             <a:fld id="{2E87DDE1-5A4D-4C5E-B27A-0A67D24EC879}" type="datetimeFigureOut">
               <a:rPr lang="en-GB" smtClean="0"/>
-              <a:t>14/04/2015</a:t>
+              <a:t>15/04/2015</a:t>
             </a:fld>
             <a:endParaRPr lang="en-GB"/>
           </a:p>
@@ -517,30 +523,6 @@
           <a:bodyPr/>
           <a:lstStyle/>
           <a:p>
-            <a:r>
-              <a:rPr lang="en-GB" dirty="0" smtClean="0"/>
-              <a:t>Who I</a:t>
-            </a:r>
-            <a:r>
-              <a:rPr lang="en-GB" baseline="0" dirty="0" smtClean="0"/>
-              <a:t> am</a:t>
-            </a:r>
-          </a:p>
-          <a:p>
-            <a:r>
-              <a:rPr lang="en-GB" baseline="0" dirty="0" smtClean="0"/>
-              <a:t>What this is about</a:t>
-            </a:r>
-          </a:p>
-          <a:p>
-            <a:r>
-              <a:rPr lang="en-GB" baseline="0" dirty="0" smtClean="0"/>
-              <a:t>Why they </a:t>
-            </a:r>
-            <a:r>
-              <a:rPr lang="en-GB" b="1" baseline="0" dirty="0" smtClean="0"/>
-              <a:t>should care</a:t>
-            </a:r>
             <a:endParaRPr lang="en-GB" b="1" dirty="0"/>
           </a:p>
         </p:txBody>
@@ -572,6 +554,174 @@
     <p:extLst>
       <p:ext uri="{BB962C8B-B14F-4D97-AF65-F5344CB8AC3E}">
         <p14:creationId xmlns:p14="http://schemas.microsoft.com/office/powerpoint/2010/main" val="3714182811"/>
+      </p:ext>
+    </p:extLst>
+  </p:cSld>
+  <p:clrMapOvr>
+    <a:masterClrMapping/>
+  </p:clrMapOvr>
+</p:notes>
+</file>
+
+<file path=ppt/notesSlides/notesSlide10.xml><?xml version="1.0" encoding="utf-8"?>
+<p:notes xmlns:a="http://schemas.openxmlformats.org/drawingml/2006/main" xmlns:r="http://schemas.openxmlformats.org/officeDocument/2006/relationships" xmlns:p="http://schemas.openxmlformats.org/presentationml/2006/main">
+  <p:cSld>
+    <p:spTree>
+      <p:nvGrpSpPr>
+        <p:cNvPr id="1" name=""/>
+        <p:cNvGrpSpPr/>
+        <p:nvPr/>
+      </p:nvGrpSpPr>
+      <p:grpSpPr>
+        <a:xfrm>
+          <a:off x="0" y="0"/>
+          <a:ext cx="0" cy="0"/>
+          <a:chOff x="0" y="0"/>
+          <a:chExt cx="0" cy="0"/>
+        </a:xfrm>
+      </p:grpSpPr>
+      <p:sp>
+        <p:nvSpPr>
+          <p:cNvPr id="2" name="Slide Image Placeholder 1"/>
+          <p:cNvSpPr>
+            <a:spLocks noGrp="1" noRot="1" noChangeAspect="1"/>
+          </p:cNvSpPr>
+          <p:nvPr>
+            <p:ph type="sldImg"/>
+          </p:nvPr>
+        </p:nvSpPr>
+        <p:spPr/>
+      </p:sp>
+      <p:sp>
+        <p:nvSpPr>
+          <p:cNvPr id="3" name="Notes Placeholder 2"/>
+          <p:cNvSpPr>
+            <a:spLocks noGrp="1"/>
+          </p:cNvSpPr>
+          <p:nvPr>
+            <p:ph type="body" idx="1"/>
+          </p:nvPr>
+        </p:nvSpPr>
+        <p:spPr/>
+        <p:txBody>
+          <a:bodyPr/>
+          <a:lstStyle/>
+          <a:p>
+            <a:endParaRPr lang="en-GB" dirty="0"/>
+          </a:p>
+        </p:txBody>
+      </p:sp>
+      <p:sp>
+        <p:nvSpPr>
+          <p:cNvPr id="4" name="Slide Number Placeholder 3"/>
+          <p:cNvSpPr>
+            <a:spLocks noGrp="1"/>
+          </p:cNvSpPr>
+          <p:nvPr>
+            <p:ph type="sldNum" sz="quarter" idx="10"/>
+          </p:nvPr>
+        </p:nvSpPr>
+        <p:spPr/>
+        <p:txBody>
+          <a:bodyPr/>
+          <a:lstStyle/>
+          <a:p>
+            <a:fld id="{F6AE6D5B-B1C4-4F57-98D1-0105294F2AB3}" type="slidenum">
+              <a:rPr lang="en-GB" smtClean="0"/>
+              <a:t>10</a:t>
+            </a:fld>
+            <a:endParaRPr lang="en-GB"/>
+          </a:p>
+        </p:txBody>
+      </p:sp>
+    </p:spTree>
+    <p:extLst>
+      <p:ext uri="{BB962C8B-B14F-4D97-AF65-F5344CB8AC3E}">
+        <p14:creationId xmlns:p14="http://schemas.microsoft.com/office/powerpoint/2010/main" val="1199013779"/>
+      </p:ext>
+    </p:extLst>
+  </p:cSld>
+  <p:clrMapOvr>
+    <a:masterClrMapping/>
+  </p:clrMapOvr>
+</p:notes>
+</file>
+
+<file path=ppt/notesSlides/notesSlide11.xml><?xml version="1.0" encoding="utf-8"?>
+<p:notes xmlns:a="http://schemas.openxmlformats.org/drawingml/2006/main" xmlns:r="http://schemas.openxmlformats.org/officeDocument/2006/relationships" xmlns:p="http://schemas.openxmlformats.org/presentationml/2006/main">
+  <p:cSld>
+    <p:spTree>
+      <p:nvGrpSpPr>
+        <p:cNvPr id="1" name=""/>
+        <p:cNvGrpSpPr/>
+        <p:nvPr/>
+      </p:nvGrpSpPr>
+      <p:grpSpPr>
+        <a:xfrm>
+          <a:off x="0" y="0"/>
+          <a:ext cx="0" cy="0"/>
+          <a:chOff x="0" y="0"/>
+          <a:chExt cx="0" cy="0"/>
+        </a:xfrm>
+      </p:grpSpPr>
+      <p:sp>
+        <p:nvSpPr>
+          <p:cNvPr id="2" name="Slide Image Placeholder 1"/>
+          <p:cNvSpPr>
+            <a:spLocks noGrp="1" noRot="1" noChangeAspect="1"/>
+          </p:cNvSpPr>
+          <p:nvPr>
+            <p:ph type="sldImg"/>
+          </p:nvPr>
+        </p:nvSpPr>
+        <p:spPr/>
+      </p:sp>
+      <p:sp>
+        <p:nvSpPr>
+          <p:cNvPr id="3" name="Notes Placeholder 2"/>
+          <p:cNvSpPr>
+            <a:spLocks noGrp="1"/>
+          </p:cNvSpPr>
+          <p:nvPr>
+            <p:ph type="body" idx="1"/>
+          </p:nvPr>
+        </p:nvSpPr>
+        <p:spPr/>
+        <p:txBody>
+          <a:bodyPr/>
+          <a:lstStyle/>
+          <a:p>
+            <a:endParaRPr lang="en-GB" dirty="0"/>
+          </a:p>
+        </p:txBody>
+      </p:sp>
+      <p:sp>
+        <p:nvSpPr>
+          <p:cNvPr id="4" name="Slide Number Placeholder 3"/>
+          <p:cNvSpPr>
+            <a:spLocks noGrp="1"/>
+          </p:cNvSpPr>
+          <p:nvPr>
+            <p:ph type="sldNum" sz="quarter" idx="10"/>
+          </p:nvPr>
+        </p:nvSpPr>
+        <p:spPr/>
+        <p:txBody>
+          <a:bodyPr/>
+          <a:lstStyle/>
+          <a:p>
+            <a:fld id="{F6AE6D5B-B1C4-4F57-98D1-0105294F2AB3}" type="slidenum">
+              <a:rPr lang="en-GB" smtClean="0"/>
+              <a:t>11</a:t>
+            </a:fld>
+            <a:endParaRPr lang="en-GB"/>
+          </a:p>
+        </p:txBody>
+      </p:sp>
+    </p:spTree>
+    <p:extLst>
+      <p:ext uri="{BB962C8B-B14F-4D97-AF65-F5344CB8AC3E}">
+        <p14:creationId xmlns:p14="http://schemas.microsoft.com/office/powerpoint/2010/main" val="3496184003"/>
       </p:ext>
     </p:extLst>
   </p:cSld>
@@ -709,7 +859,34 @@
           <a:bodyPr/>
           <a:lstStyle/>
           <a:p>
-            <a:endParaRPr lang="en-GB"/>
+            <a:r>
+              <a:rPr lang="en-GB" dirty="0" smtClean="0"/>
+              <a:t>Who I</a:t>
+            </a:r>
+            <a:r>
+              <a:rPr lang="en-GB" baseline="0" dirty="0" smtClean="0"/>
+              <a:t> am</a:t>
+            </a:r>
+          </a:p>
+          <a:p>
+            <a:r>
+              <a:rPr lang="en-GB" baseline="0" dirty="0" smtClean="0"/>
+              <a:t>What this is about</a:t>
+            </a:r>
+          </a:p>
+          <a:p>
+            <a:r>
+              <a:rPr lang="en-GB" baseline="0" dirty="0" smtClean="0"/>
+              <a:t>Why they </a:t>
+            </a:r>
+            <a:r>
+              <a:rPr lang="en-GB" b="1" baseline="0" dirty="0" smtClean="0"/>
+              <a:t>should care</a:t>
+            </a:r>
+            <a:endParaRPr lang="en-GB" b="1" dirty="0" smtClean="0"/>
+          </a:p>
+          <a:p>
+            <a:endParaRPr lang="en-GB" dirty="0"/>
           </a:p>
         </p:txBody>
       </p:sp>
@@ -795,12 +972,31 @@
           <a:p>
             <a:r>
               <a:rPr lang="en-GB" dirty="0" smtClean="0"/>
-              <a:t>Listening</a:t>
+              <a:t>Who I</a:t>
             </a:r>
             <a:r>
               <a:rPr lang="en-GB" baseline="0" dirty="0" smtClean="0"/>
-              <a:t> to the same music at work… wanted more!</a:t>
-            </a:r>
+              <a:t> am</a:t>
+            </a:r>
+          </a:p>
+          <a:p>
+            <a:r>
+              <a:rPr lang="en-GB" baseline="0" dirty="0" smtClean="0"/>
+              <a:t>What this is about</a:t>
+            </a:r>
+          </a:p>
+          <a:p>
+            <a:r>
+              <a:rPr lang="en-GB" baseline="0" dirty="0" smtClean="0"/>
+              <a:t>Why they </a:t>
+            </a:r>
+            <a:r>
+              <a:rPr lang="en-GB" b="1" baseline="0" dirty="0" smtClean="0"/>
+              <a:t>should care</a:t>
+            </a:r>
+            <a:endParaRPr lang="en-GB" b="1" dirty="0" smtClean="0"/>
+          </a:p>
+          <a:p>
             <a:endParaRPr lang="en-GB" dirty="0"/>
           </a:p>
         </p:txBody>
@@ -831,7 +1027,459 @@
     </p:spTree>
     <p:extLst>
       <p:ext uri="{BB962C8B-B14F-4D97-AF65-F5344CB8AC3E}">
+        <p14:creationId xmlns:p14="http://schemas.microsoft.com/office/powerpoint/2010/main" val="489425343"/>
+      </p:ext>
+    </p:extLst>
+  </p:cSld>
+  <p:clrMapOvr>
+    <a:masterClrMapping/>
+  </p:clrMapOvr>
+</p:notes>
+</file>
+
+<file path=ppt/notesSlides/notesSlide5.xml><?xml version="1.0" encoding="utf-8"?>
+<p:notes xmlns:a="http://schemas.openxmlformats.org/drawingml/2006/main" xmlns:r="http://schemas.openxmlformats.org/officeDocument/2006/relationships" xmlns:p="http://schemas.openxmlformats.org/presentationml/2006/main">
+  <p:cSld>
+    <p:spTree>
+      <p:nvGrpSpPr>
+        <p:cNvPr id="1" name=""/>
+        <p:cNvGrpSpPr/>
+        <p:nvPr/>
+      </p:nvGrpSpPr>
+      <p:grpSpPr>
+        <a:xfrm>
+          <a:off x="0" y="0"/>
+          <a:ext cx="0" cy="0"/>
+          <a:chOff x="0" y="0"/>
+          <a:chExt cx="0" cy="0"/>
+        </a:xfrm>
+      </p:grpSpPr>
+      <p:sp>
+        <p:nvSpPr>
+          <p:cNvPr id="2" name="Slide Image Placeholder 1"/>
+          <p:cNvSpPr>
+            <a:spLocks noGrp="1" noRot="1" noChangeAspect="1"/>
+          </p:cNvSpPr>
+          <p:nvPr>
+            <p:ph type="sldImg"/>
+          </p:nvPr>
+        </p:nvSpPr>
+        <p:spPr/>
+      </p:sp>
+      <p:sp>
+        <p:nvSpPr>
+          <p:cNvPr id="3" name="Notes Placeholder 2"/>
+          <p:cNvSpPr>
+            <a:spLocks noGrp="1"/>
+          </p:cNvSpPr>
+          <p:nvPr>
+            <p:ph type="body" idx="1"/>
+          </p:nvPr>
+        </p:nvSpPr>
+        <p:spPr/>
+        <p:txBody>
+          <a:bodyPr/>
+          <a:lstStyle/>
+          <a:p>
+            <a:pPr marL="0" marR="0" indent="0" algn="l" defTabSz="914400" rtl="0" eaLnBrk="1" fontAlgn="auto" latinLnBrk="0" hangingPunct="1">
+              <a:lnSpc>
+                <a:spcPct val="100000"/>
+              </a:lnSpc>
+              <a:spcBef>
+                <a:spcPts val="0"/>
+              </a:spcBef>
+              <a:spcAft>
+                <a:spcPts val="0"/>
+              </a:spcAft>
+              <a:buClrTx/>
+              <a:buSzTx/>
+              <a:buFontTx/>
+              <a:buNone/>
+              <a:tabLst/>
+              <a:defRPr/>
+            </a:pPr>
+            <a:r>
+              <a:rPr lang="en-GB" sz="1200" kern="1200" dirty="0" smtClean="0">
+                <a:solidFill>
+                  <a:schemeClr val="tx1"/>
+                </a:solidFill>
+                <a:effectLst/>
+                <a:latin typeface="+mn-lt"/>
+                <a:ea typeface="+mn-ea"/>
+                <a:cs typeface="+mn-cs"/>
+              </a:rPr>
+              <a:t>"While coding at work I want to listen to great songs and albums that I know" .  So I curious about Spotify and I set out to find out more.   Along the way I encountered many dragons.. Those stories I'll share today.. built website, purely for fun, to help me navigate the 38m songs in Spotify.</a:t>
+            </a:r>
+            <a:endParaRPr lang="en-GB" dirty="0" smtClean="0"/>
+          </a:p>
+          <a:p>
+            <a:endParaRPr lang="en-GB" dirty="0"/>
+          </a:p>
+        </p:txBody>
+      </p:sp>
+      <p:sp>
+        <p:nvSpPr>
+          <p:cNvPr id="4" name="Slide Number Placeholder 3"/>
+          <p:cNvSpPr>
+            <a:spLocks noGrp="1"/>
+          </p:cNvSpPr>
+          <p:nvPr>
+            <p:ph type="sldNum" sz="quarter" idx="10"/>
+          </p:nvPr>
+        </p:nvSpPr>
+        <p:spPr/>
+        <p:txBody>
+          <a:bodyPr/>
+          <a:lstStyle/>
+          <a:p>
+            <a:fld id="{F6AE6D5B-B1C4-4F57-98D1-0105294F2AB3}" type="slidenum">
+              <a:rPr lang="en-GB" smtClean="0"/>
+              <a:t>5</a:t>
+            </a:fld>
+            <a:endParaRPr lang="en-GB"/>
+          </a:p>
+        </p:txBody>
+      </p:sp>
+    </p:spTree>
+    <p:extLst>
+      <p:ext uri="{BB962C8B-B14F-4D97-AF65-F5344CB8AC3E}">
         <p14:creationId xmlns:p14="http://schemas.microsoft.com/office/powerpoint/2010/main" val="1840676550"/>
+      </p:ext>
+    </p:extLst>
+  </p:cSld>
+  <p:clrMapOvr>
+    <a:masterClrMapping/>
+  </p:clrMapOvr>
+</p:notes>
+</file>
+
+<file path=ppt/notesSlides/notesSlide6.xml><?xml version="1.0" encoding="utf-8"?>
+<p:notes xmlns:a="http://schemas.openxmlformats.org/drawingml/2006/main" xmlns:r="http://schemas.openxmlformats.org/officeDocument/2006/relationships" xmlns:p="http://schemas.openxmlformats.org/presentationml/2006/main">
+  <p:cSld>
+    <p:spTree>
+      <p:nvGrpSpPr>
+        <p:cNvPr id="1" name=""/>
+        <p:cNvGrpSpPr/>
+        <p:nvPr/>
+      </p:nvGrpSpPr>
+      <p:grpSpPr>
+        <a:xfrm>
+          <a:off x="0" y="0"/>
+          <a:ext cx="0" cy="0"/>
+          <a:chOff x="0" y="0"/>
+          <a:chExt cx="0" cy="0"/>
+        </a:xfrm>
+      </p:grpSpPr>
+      <p:sp>
+        <p:nvSpPr>
+          <p:cNvPr id="2" name="Slide Image Placeholder 1"/>
+          <p:cNvSpPr>
+            <a:spLocks noGrp="1" noRot="1" noChangeAspect="1"/>
+          </p:cNvSpPr>
+          <p:nvPr>
+            <p:ph type="sldImg"/>
+          </p:nvPr>
+        </p:nvSpPr>
+        <p:spPr/>
+      </p:sp>
+      <p:sp>
+        <p:nvSpPr>
+          <p:cNvPr id="3" name="Notes Placeholder 2"/>
+          <p:cNvSpPr>
+            <a:spLocks noGrp="1"/>
+          </p:cNvSpPr>
+          <p:nvPr>
+            <p:ph type="body" idx="1"/>
+          </p:nvPr>
+        </p:nvSpPr>
+        <p:spPr/>
+        <p:txBody>
+          <a:bodyPr/>
+          <a:lstStyle/>
+          <a:p>
+            <a:endParaRPr lang="en-GB" dirty="0"/>
+          </a:p>
+        </p:txBody>
+      </p:sp>
+      <p:sp>
+        <p:nvSpPr>
+          <p:cNvPr id="4" name="Slide Number Placeholder 3"/>
+          <p:cNvSpPr>
+            <a:spLocks noGrp="1"/>
+          </p:cNvSpPr>
+          <p:nvPr>
+            <p:ph type="sldNum" sz="quarter" idx="10"/>
+          </p:nvPr>
+        </p:nvSpPr>
+        <p:spPr/>
+        <p:txBody>
+          <a:bodyPr/>
+          <a:lstStyle/>
+          <a:p>
+            <a:fld id="{F6AE6D5B-B1C4-4F57-98D1-0105294F2AB3}" type="slidenum">
+              <a:rPr lang="en-GB" smtClean="0"/>
+              <a:t>6</a:t>
+            </a:fld>
+            <a:endParaRPr lang="en-GB"/>
+          </a:p>
+        </p:txBody>
+      </p:sp>
+    </p:spTree>
+    <p:extLst>
+      <p:ext uri="{BB962C8B-B14F-4D97-AF65-F5344CB8AC3E}">
+        <p14:creationId xmlns:p14="http://schemas.microsoft.com/office/powerpoint/2010/main" val="3814009017"/>
+      </p:ext>
+    </p:extLst>
+  </p:cSld>
+  <p:clrMapOvr>
+    <a:masterClrMapping/>
+  </p:clrMapOvr>
+</p:notes>
+</file>
+
+<file path=ppt/notesSlides/notesSlide7.xml><?xml version="1.0" encoding="utf-8"?>
+<p:notes xmlns:a="http://schemas.openxmlformats.org/drawingml/2006/main" xmlns:r="http://schemas.openxmlformats.org/officeDocument/2006/relationships" xmlns:p="http://schemas.openxmlformats.org/presentationml/2006/main">
+  <p:cSld>
+    <p:spTree>
+      <p:nvGrpSpPr>
+        <p:cNvPr id="1" name=""/>
+        <p:cNvGrpSpPr/>
+        <p:nvPr/>
+      </p:nvGrpSpPr>
+      <p:grpSpPr>
+        <a:xfrm>
+          <a:off x="0" y="0"/>
+          <a:ext cx="0" cy="0"/>
+          <a:chOff x="0" y="0"/>
+          <a:chExt cx="0" cy="0"/>
+        </a:xfrm>
+      </p:grpSpPr>
+      <p:sp>
+        <p:nvSpPr>
+          <p:cNvPr id="2" name="Slide Image Placeholder 1"/>
+          <p:cNvSpPr>
+            <a:spLocks noGrp="1" noRot="1" noChangeAspect="1"/>
+          </p:cNvSpPr>
+          <p:nvPr>
+            <p:ph type="sldImg"/>
+          </p:nvPr>
+        </p:nvSpPr>
+        <p:spPr/>
+      </p:sp>
+      <p:sp>
+        <p:nvSpPr>
+          <p:cNvPr id="3" name="Notes Placeholder 2"/>
+          <p:cNvSpPr>
+            <a:spLocks noGrp="1"/>
+          </p:cNvSpPr>
+          <p:nvPr>
+            <p:ph type="body" idx="1"/>
+          </p:nvPr>
+        </p:nvSpPr>
+        <p:spPr/>
+        <p:txBody>
+          <a:bodyPr/>
+          <a:lstStyle/>
+          <a:p>
+            <a:endParaRPr lang="en-GB" dirty="0"/>
+          </a:p>
+        </p:txBody>
+      </p:sp>
+      <p:sp>
+        <p:nvSpPr>
+          <p:cNvPr id="4" name="Slide Number Placeholder 3"/>
+          <p:cNvSpPr>
+            <a:spLocks noGrp="1"/>
+          </p:cNvSpPr>
+          <p:nvPr>
+            <p:ph type="sldNum" sz="quarter" idx="10"/>
+          </p:nvPr>
+        </p:nvSpPr>
+        <p:spPr/>
+        <p:txBody>
+          <a:bodyPr/>
+          <a:lstStyle/>
+          <a:p>
+            <a:fld id="{F6AE6D5B-B1C4-4F57-98D1-0105294F2AB3}" type="slidenum">
+              <a:rPr lang="en-GB" smtClean="0"/>
+              <a:t>7</a:t>
+            </a:fld>
+            <a:endParaRPr lang="en-GB"/>
+          </a:p>
+        </p:txBody>
+      </p:sp>
+    </p:spTree>
+    <p:extLst>
+      <p:ext uri="{BB962C8B-B14F-4D97-AF65-F5344CB8AC3E}">
+        <p14:creationId xmlns:p14="http://schemas.microsoft.com/office/powerpoint/2010/main" val="3317584047"/>
+      </p:ext>
+    </p:extLst>
+  </p:cSld>
+  <p:clrMapOvr>
+    <a:masterClrMapping/>
+  </p:clrMapOvr>
+</p:notes>
+</file>
+
+<file path=ppt/notesSlides/notesSlide8.xml><?xml version="1.0" encoding="utf-8"?>
+<p:notes xmlns:a="http://schemas.openxmlformats.org/drawingml/2006/main" xmlns:r="http://schemas.openxmlformats.org/officeDocument/2006/relationships" xmlns:p="http://schemas.openxmlformats.org/presentationml/2006/main">
+  <p:cSld>
+    <p:spTree>
+      <p:nvGrpSpPr>
+        <p:cNvPr id="1" name=""/>
+        <p:cNvGrpSpPr/>
+        <p:nvPr/>
+      </p:nvGrpSpPr>
+      <p:grpSpPr>
+        <a:xfrm>
+          <a:off x="0" y="0"/>
+          <a:ext cx="0" cy="0"/>
+          <a:chOff x="0" y="0"/>
+          <a:chExt cx="0" cy="0"/>
+        </a:xfrm>
+      </p:grpSpPr>
+      <p:sp>
+        <p:nvSpPr>
+          <p:cNvPr id="2" name="Slide Image Placeholder 1"/>
+          <p:cNvSpPr>
+            <a:spLocks noGrp="1" noRot="1" noChangeAspect="1"/>
+          </p:cNvSpPr>
+          <p:nvPr>
+            <p:ph type="sldImg"/>
+          </p:nvPr>
+        </p:nvSpPr>
+        <p:spPr/>
+      </p:sp>
+      <p:sp>
+        <p:nvSpPr>
+          <p:cNvPr id="3" name="Notes Placeholder 2"/>
+          <p:cNvSpPr>
+            <a:spLocks noGrp="1"/>
+          </p:cNvSpPr>
+          <p:nvPr>
+            <p:ph type="body" idx="1"/>
+          </p:nvPr>
+        </p:nvSpPr>
+        <p:spPr/>
+        <p:txBody>
+          <a:bodyPr/>
+          <a:lstStyle/>
+          <a:p>
+            <a:endParaRPr lang="en-GB" dirty="0"/>
+          </a:p>
+        </p:txBody>
+      </p:sp>
+      <p:sp>
+        <p:nvSpPr>
+          <p:cNvPr id="4" name="Slide Number Placeholder 3"/>
+          <p:cNvSpPr>
+            <a:spLocks noGrp="1"/>
+          </p:cNvSpPr>
+          <p:nvPr>
+            <p:ph type="sldNum" sz="quarter" idx="10"/>
+          </p:nvPr>
+        </p:nvSpPr>
+        <p:spPr/>
+        <p:txBody>
+          <a:bodyPr/>
+          <a:lstStyle/>
+          <a:p>
+            <a:fld id="{F6AE6D5B-B1C4-4F57-98D1-0105294F2AB3}" type="slidenum">
+              <a:rPr lang="en-GB" smtClean="0"/>
+              <a:t>8</a:t>
+            </a:fld>
+            <a:endParaRPr lang="en-GB"/>
+          </a:p>
+        </p:txBody>
+      </p:sp>
+    </p:spTree>
+    <p:extLst>
+      <p:ext uri="{BB962C8B-B14F-4D97-AF65-F5344CB8AC3E}">
+        <p14:creationId xmlns:p14="http://schemas.microsoft.com/office/powerpoint/2010/main" val="899699956"/>
+      </p:ext>
+    </p:extLst>
+  </p:cSld>
+  <p:clrMapOvr>
+    <a:masterClrMapping/>
+  </p:clrMapOvr>
+</p:notes>
+</file>
+
+<file path=ppt/notesSlides/notesSlide9.xml><?xml version="1.0" encoding="utf-8"?>
+<p:notes xmlns:a="http://schemas.openxmlformats.org/drawingml/2006/main" xmlns:r="http://schemas.openxmlformats.org/officeDocument/2006/relationships" xmlns:p="http://schemas.openxmlformats.org/presentationml/2006/main">
+  <p:cSld>
+    <p:spTree>
+      <p:nvGrpSpPr>
+        <p:cNvPr id="1" name=""/>
+        <p:cNvGrpSpPr/>
+        <p:nvPr/>
+      </p:nvGrpSpPr>
+      <p:grpSpPr>
+        <a:xfrm>
+          <a:off x="0" y="0"/>
+          <a:ext cx="0" cy="0"/>
+          <a:chOff x="0" y="0"/>
+          <a:chExt cx="0" cy="0"/>
+        </a:xfrm>
+      </p:grpSpPr>
+      <p:sp>
+        <p:nvSpPr>
+          <p:cNvPr id="2" name="Slide Image Placeholder 1"/>
+          <p:cNvSpPr>
+            <a:spLocks noGrp="1" noRot="1" noChangeAspect="1"/>
+          </p:cNvSpPr>
+          <p:nvPr>
+            <p:ph type="sldImg"/>
+          </p:nvPr>
+        </p:nvSpPr>
+        <p:spPr/>
+      </p:sp>
+      <p:sp>
+        <p:nvSpPr>
+          <p:cNvPr id="3" name="Notes Placeholder 2"/>
+          <p:cNvSpPr>
+            <a:spLocks noGrp="1"/>
+          </p:cNvSpPr>
+          <p:nvPr>
+            <p:ph type="body" idx="1"/>
+          </p:nvPr>
+        </p:nvSpPr>
+        <p:spPr/>
+        <p:txBody>
+          <a:bodyPr/>
+          <a:lstStyle/>
+          <a:p>
+            <a:endParaRPr lang="en-GB" dirty="0"/>
+          </a:p>
+        </p:txBody>
+      </p:sp>
+      <p:sp>
+        <p:nvSpPr>
+          <p:cNvPr id="4" name="Slide Number Placeholder 3"/>
+          <p:cNvSpPr>
+            <a:spLocks noGrp="1"/>
+          </p:cNvSpPr>
+          <p:nvPr>
+            <p:ph type="sldNum" sz="quarter" idx="10"/>
+          </p:nvPr>
+        </p:nvSpPr>
+        <p:spPr/>
+        <p:txBody>
+          <a:bodyPr/>
+          <a:lstStyle/>
+          <a:p>
+            <a:fld id="{F6AE6D5B-B1C4-4F57-98D1-0105294F2AB3}" type="slidenum">
+              <a:rPr lang="en-GB" smtClean="0"/>
+              <a:t>9</a:t>
+            </a:fld>
+            <a:endParaRPr lang="en-GB"/>
+          </a:p>
+        </p:txBody>
+      </p:sp>
+    </p:spTree>
+    <p:extLst>
+      <p:ext uri="{BB962C8B-B14F-4D97-AF65-F5344CB8AC3E}">
+        <p14:creationId xmlns:p14="http://schemas.microsoft.com/office/powerpoint/2010/main" val="562951016"/>
       </p:ext>
     </p:extLst>
   </p:cSld>
@@ -993,7 +1641,7 @@
           <a:p>
             <a:fld id="{04FDAF21-1349-46D7-892C-118DDD78669D}" type="datetimeFigureOut">
               <a:rPr lang="en-GB" smtClean="0"/>
-              <a:t>14/04/2015</a:t>
+              <a:t>15/04/2015</a:t>
             </a:fld>
             <a:endParaRPr lang="en-GB"/>
           </a:p>
@@ -1253,7 +1901,7 @@
           <a:p>
             <a:fld id="{04FDAF21-1349-46D7-892C-118DDD78669D}" type="datetimeFigureOut">
               <a:rPr lang="en-GB" smtClean="0"/>
-              <a:t>14/04/2015</a:t>
+              <a:t>15/04/2015</a:t>
             </a:fld>
             <a:endParaRPr lang="en-GB"/>
           </a:p>
@@ -1423,7 +2071,7 @@
           <a:p>
             <a:fld id="{04FDAF21-1349-46D7-892C-118DDD78669D}" type="datetimeFigureOut">
               <a:rPr lang="en-GB" smtClean="0"/>
-              <a:t>14/04/2015</a:t>
+              <a:t>15/04/2015</a:t>
             </a:fld>
             <a:endParaRPr lang="en-GB"/>
           </a:p>
@@ -1603,7 +2251,7 @@
           <a:p>
             <a:fld id="{04FDAF21-1349-46D7-892C-118DDD78669D}" type="datetimeFigureOut">
               <a:rPr lang="en-GB" smtClean="0"/>
-              <a:t>14/04/2015</a:t>
+              <a:t>15/04/2015</a:t>
             </a:fld>
             <a:endParaRPr lang="en-GB"/>
           </a:p>
@@ -1859,7 +2507,7 @@
           <a:p>
             <a:fld id="{04FDAF21-1349-46D7-892C-118DDD78669D}" type="datetimeFigureOut">
               <a:rPr lang="en-GB" smtClean="0"/>
-              <a:t>14/04/2015</a:t>
+              <a:t>15/04/2015</a:t>
             </a:fld>
             <a:endParaRPr lang="en-GB"/>
           </a:p>
@@ -2116,7 +2764,7 @@
           <a:p>
             <a:fld id="{04FDAF21-1349-46D7-892C-118DDD78669D}" type="datetimeFigureOut">
               <a:rPr lang="en-GB" smtClean="0"/>
-              <a:t>14/04/2015</a:t>
+              <a:t>15/04/2015</a:t>
             </a:fld>
             <a:endParaRPr lang="en-GB"/>
           </a:p>
@@ -2385,7 +3033,7 @@
           <a:p>
             <a:fld id="{04FDAF21-1349-46D7-892C-118DDD78669D}" type="datetimeFigureOut">
               <a:rPr lang="en-GB" smtClean="0"/>
-              <a:t>14/04/2015</a:t>
+              <a:t>15/04/2015</a:t>
             </a:fld>
             <a:endParaRPr lang="en-GB"/>
           </a:p>
@@ -2624,7 +3272,7 @@
           <a:p>
             <a:fld id="{04FDAF21-1349-46D7-892C-118DDD78669D}" type="datetimeFigureOut">
               <a:rPr lang="en-GB" smtClean="0"/>
-              <a:t>14/04/2015</a:t>
+              <a:t>15/04/2015</a:t>
             </a:fld>
             <a:endParaRPr lang="en-GB"/>
           </a:p>
@@ -2991,7 +3639,7 @@
           <a:p>
             <a:fld id="{04FDAF21-1349-46D7-892C-118DDD78669D}" type="datetimeFigureOut">
               <a:rPr lang="en-GB" smtClean="0"/>
-              <a:t>14/04/2015</a:t>
+              <a:t>15/04/2015</a:t>
             </a:fld>
             <a:endParaRPr lang="en-GB"/>
           </a:p>
@@ -3109,7 +3757,7 @@
           <a:p>
             <a:fld id="{04FDAF21-1349-46D7-892C-118DDD78669D}" type="datetimeFigureOut">
               <a:rPr lang="en-GB" smtClean="0"/>
-              <a:t>14/04/2015</a:t>
+              <a:t>15/04/2015</a:t>
             </a:fld>
             <a:endParaRPr lang="en-GB"/>
           </a:p>
@@ -3204,7 +3852,7 @@
           <a:p>
             <a:fld id="{04FDAF21-1349-46D7-892C-118DDD78669D}" type="datetimeFigureOut">
               <a:rPr lang="en-GB" smtClean="0"/>
-              <a:t>14/04/2015</a:t>
+              <a:t>15/04/2015</a:t>
             </a:fld>
             <a:endParaRPr lang="en-GB"/>
           </a:p>
@@ -3481,7 +4129,7 @@
           <a:p>
             <a:fld id="{04FDAF21-1349-46D7-892C-118DDD78669D}" type="datetimeFigureOut">
               <a:rPr lang="en-GB" smtClean="0"/>
-              <a:t>14/04/2015</a:t>
+              <a:t>15/04/2015</a:t>
             </a:fld>
             <a:endParaRPr lang="en-GB"/>
           </a:p>
@@ -3706,7 +4354,7 @@
           <a:p>
             <a:fld id="{04FDAF21-1349-46D7-892C-118DDD78669D}" type="datetimeFigureOut">
               <a:rPr lang="en-GB" smtClean="0"/>
-              <a:t>14/04/2015</a:t>
+              <a:t>15/04/2015</a:t>
             </a:fld>
             <a:endParaRPr lang="en-GB"/>
           </a:p>
@@ -4154,15 +4802,81 @@
         </p:nvSpPr>
         <p:spPr>
           <a:xfrm>
-            <a:off x="1524000" y="3602038"/>
-            <a:ext cx="2867526" cy="693236"/>
+            <a:off x="1523999" y="3602038"/>
+            <a:ext cx="6787243" cy="1084262"/>
           </a:xfrm>
         </p:spPr>
         <p:txBody>
-          <a:bodyPr/>
-          <a:lstStyle/>
-          <a:p>
-            <a:endParaRPr lang="en-GB" dirty="0"/>
+          <a:bodyPr>
+            <a:noAutofit/>
+          </a:bodyPr>
+          <a:lstStyle/>
+          <a:p>
+            <a:r>
+              <a:rPr lang="en-GB" sz="3200" dirty="0" err="1">
+                <a:solidFill>
+                  <a:schemeClr val="tx1">
+                    <a:lumMod val="75000"/>
+                    <a:lumOff val="25000"/>
+                  </a:schemeClr>
+                </a:solidFill>
+              </a:rPr>
+              <a:t>d</a:t>
+            </a:r>
+            <a:r>
+              <a:rPr lang="en-GB" sz="3200" dirty="0" err="1" smtClean="0">
+                <a:solidFill>
+                  <a:schemeClr val="tx1">
+                    <a:lumMod val="75000"/>
+                    <a:lumOff val="25000"/>
+                  </a:schemeClr>
+                </a:solidFill>
+              </a:rPr>
+              <a:t>avemateer</a:t>
+            </a:r>
+            <a:r>
+              <a:rPr lang="en-GB" sz="3200" dirty="0" smtClean="0">
+                <a:solidFill>
+                  <a:schemeClr val="tx1">
+                    <a:lumMod val="75000"/>
+                    <a:lumOff val="25000"/>
+                  </a:schemeClr>
+                </a:solidFill>
+              </a:rPr>
+              <a:t> at gmail.com</a:t>
+            </a:r>
+          </a:p>
+          <a:p>
+            <a:r>
+              <a:rPr lang="en-GB" sz="3200" dirty="0" smtClean="0">
+                <a:solidFill>
+                  <a:schemeClr val="tx1">
+                    <a:lumMod val="75000"/>
+                    <a:lumOff val="25000"/>
+                  </a:schemeClr>
+                </a:solidFill>
+              </a:rPr>
+              <a:t>github.com/</a:t>
+            </a:r>
+            <a:r>
+              <a:rPr lang="en-GB" sz="3200" dirty="0" err="1" smtClean="0">
+                <a:solidFill>
+                  <a:schemeClr val="tx1">
+                    <a:lumMod val="75000"/>
+                    <a:lumOff val="25000"/>
+                  </a:schemeClr>
+                </a:solidFill>
+              </a:rPr>
+              <a:t>djhmateer</a:t>
+            </a:r>
+            <a:endParaRPr lang="en-GB" sz="3200" dirty="0">
+              <a:solidFill>
+                <a:schemeClr val="tx1">
+                  <a:lumMod val="75000"/>
+                  <a:lumOff val="25000"/>
+                </a:schemeClr>
+              </a:solidFill>
+            </a:endParaRPr>
           </a:p>
         </p:txBody>
       </p:sp>
@@ -4188,7 +4902,7 @@
         </p:blipFill>
         <p:spPr>
           <a:xfrm>
-            <a:off x="1524000" y="3602038"/>
+            <a:off x="1524000" y="4893534"/>
             <a:ext cx="2571750" cy="476250"/>
           </a:xfrm>
           <a:prstGeom prst="rect">
@@ -4216,6 +4930,510 @@
 </p:sld>
 </file>
 
+<file path=ppt/slides/slide10.xml><?xml version="1.0" encoding="utf-8"?>
+<p:sld xmlns:a="http://schemas.openxmlformats.org/drawingml/2006/main" xmlns:r="http://schemas.openxmlformats.org/officeDocument/2006/relationships" xmlns:p="http://schemas.openxmlformats.org/presentationml/2006/main">
+  <p:cSld>
+    <p:spTree>
+      <p:nvGrpSpPr>
+        <p:cNvPr id="1" name=""/>
+        <p:cNvGrpSpPr/>
+        <p:nvPr/>
+      </p:nvGrpSpPr>
+      <p:grpSpPr>
+        <a:xfrm>
+          <a:off x="0" y="0"/>
+          <a:ext cx="0" cy="0"/>
+          <a:chOff x="0" y="0"/>
+          <a:chExt cx="0" cy="0"/>
+        </a:xfrm>
+      </p:grpSpPr>
+      <p:sp>
+        <p:nvSpPr>
+          <p:cNvPr id="3" name="Content Placeholder 2"/>
+          <p:cNvSpPr>
+            <a:spLocks noGrp="1"/>
+          </p:cNvSpPr>
+          <p:nvPr>
+            <p:ph idx="1"/>
+          </p:nvPr>
+        </p:nvSpPr>
+        <p:spPr>
+          <a:xfrm>
+            <a:off x="838200" y="2090057"/>
+            <a:ext cx="10515600" cy="3146380"/>
+          </a:xfrm>
+        </p:spPr>
+        <p:txBody>
+          <a:bodyPr>
+            <a:normAutofit/>
+          </a:bodyPr>
+          <a:lstStyle/>
+          <a:p>
+            <a:pPr marL="0" indent="0">
+              <a:buNone/>
+            </a:pPr>
+            <a:r>
+              <a:rPr lang="en-GB" sz="4400" dirty="0"/>
+              <a:t>iframe </a:t>
+            </a:r>
+            <a:r>
+              <a:rPr lang="en-GB" sz="4400" dirty="0" err="1"/>
+              <a:t>src</a:t>
+            </a:r>
+            <a:r>
+              <a:rPr lang="en-GB" sz="4400" dirty="0"/>
+              <a:t>="</a:t>
+            </a:r>
+            <a:r>
+              <a:rPr lang="en-GB" sz="4400" u="sng" dirty="0">
+                <a:hlinkClick r:id="rId3"/>
+              </a:rPr>
+              <a:t>https://embed.spotify.com/?</a:t>
+            </a:r>
+            <a:r>
+              <a:rPr lang="en-GB" sz="4400" u="sng" dirty="0" err="1" smtClean="0">
+                <a:hlinkClick r:id="rId3"/>
+              </a:rPr>
+              <a:t>uri</a:t>
+            </a:r>
+            <a:r>
+              <a:rPr lang="en-GB" sz="4400" u="sng" dirty="0" smtClean="0">
+                <a:hlinkClick r:id="rId3"/>
+              </a:rPr>
+              <a:t>=spotify:user:hoxsd:playlist:0Z7jXtAId643ujM1UPshcte“</a:t>
+            </a:r>
+            <a:endParaRPr lang="en-GB" sz="4400" u="sng" dirty="0" smtClean="0"/>
+          </a:p>
+          <a:p>
+            <a:pPr marL="0" indent="0">
+              <a:buNone/>
+            </a:pPr>
+            <a:endParaRPr lang="en-GB" sz="4400" u="sng" dirty="0"/>
+          </a:p>
+        </p:txBody>
+      </p:sp>
+      <p:sp>
+        <p:nvSpPr>
+          <p:cNvPr id="4" name="Title 3"/>
+          <p:cNvSpPr>
+            <a:spLocks noGrp="1"/>
+          </p:cNvSpPr>
+          <p:nvPr>
+            <p:ph type="title"/>
+          </p:nvPr>
+        </p:nvSpPr>
+        <p:spPr>
+          <a:xfrm>
+            <a:off x="838200" y="365125"/>
+            <a:ext cx="4389424" cy="1460500"/>
+          </a:xfrm>
+        </p:spPr>
+        <p:txBody>
+          <a:bodyPr>
+            <a:normAutofit fontScale="90000"/>
+          </a:bodyPr>
+          <a:lstStyle/>
+          <a:p>
+            <a:r>
+              <a:rPr lang="en-GB" dirty="0" smtClean="0"/>
+              <a:t>Embed Album /</a:t>
+            </a:r>
+            <a:br>
+              <a:rPr lang="en-GB" dirty="0" smtClean="0"/>
+            </a:br>
+            <a:r>
+              <a:rPr lang="en-GB" dirty="0" smtClean="0"/>
+              <a:t>Playlist</a:t>
+            </a:r>
+            <a:endParaRPr lang="en-GB" dirty="0"/>
+          </a:p>
+        </p:txBody>
+      </p:sp>
+      <p:pic>
+        <p:nvPicPr>
+          <p:cNvPr id="5122" name="Picture 2" descr="image"/>
+          <p:cNvPicPr>
+            <a:picLocks noChangeAspect="1" noChangeArrowheads="1"/>
+          </p:cNvPicPr>
+          <p:nvPr/>
+        </p:nvPicPr>
+        <p:blipFill>
+          <a:blip r:embed="rId4">
+            <a:extLst>
+              <a:ext uri="{28A0092B-C50C-407E-A947-70E740481C1C}">
+                <a14:useLocalDpi xmlns:a14="http://schemas.microsoft.com/office/drawing/2010/main" val="0"/>
+              </a:ext>
+            </a:extLst>
+          </a:blip>
+          <a:srcRect/>
+          <a:stretch>
+            <a:fillRect/>
+          </a:stretch>
+        </p:blipFill>
+        <p:spPr bwMode="auto">
+          <a:xfrm>
+            <a:off x="6818811" y="0"/>
+            <a:ext cx="5373189" cy="6828430"/>
+          </a:xfrm>
+          <a:prstGeom prst="rect">
+            <a:avLst/>
+          </a:prstGeom>
+          <a:noFill/>
+          <a:extLst>
+            <a:ext uri="{909E8E84-426E-40DD-AFC4-6F175D3DCCD1}">
+              <a14:hiddenFill xmlns:a14="http://schemas.microsoft.com/office/drawing/2010/main">
+                <a:solidFill>
+                  <a:srgbClr val="FFFFFF"/>
+                </a:solidFill>
+              </a14:hiddenFill>
+            </a:ext>
+          </a:extLst>
+        </p:spPr>
+      </p:pic>
+    </p:spTree>
+    <p:extLst>
+      <p:ext uri="{BB962C8B-B14F-4D97-AF65-F5344CB8AC3E}">
+        <p14:creationId xmlns:p14="http://schemas.microsoft.com/office/powerpoint/2010/main" val="1881090013"/>
+      </p:ext>
+    </p:extLst>
+  </p:cSld>
+  <p:clrMapOvr>
+    <a:masterClrMapping/>
+  </p:clrMapOvr>
+  <p:timing>
+    <p:tnLst>
+      <p:par>
+        <p:cTn id="1" dur="indefinite" restart="never" nodeType="tmRoot"/>
+      </p:par>
+    </p:tnLst>
+  </p:timing>
+</p:sld>
+</file>
+
+<file path=ppt/slides/slide11.xml><?xml version="1.0" encoding="utf-8"?>
+<p:sld xmlns:a="http://schemas.openxmlformats.org/drawingml/2006/main" xmlns:r="http://schemas.openxmlformats.org/officeDocument/2006/relationships" xmlns:p="http://schemas.openxmlformats.org/presentationml/2006/main">
+  <p:cSld>
+    <p:spTree>
+      <p:nvGrpSpPr>
+        <p:cNvPr id="1" name=""/>
+        <p:cNvGrpSpPr/>
+        <p:nvPr/>
+      </p:nvGrpSpPr>
+      <p:grpSpPr>
+        <a:xfrm>
+          <a:off x="0" y="0"/>
+          <a:ext cx="0" cy="0"/>
+          <a:chOff x="0" y="0"/>
+          <a:chExt cx="0" cy="0"/>
+        </a:xfrm>
+      </p:grpSpPr>
+      <p:sp>
+        <p:nvSpPr>
+          <p:cNvPr id="5" name="Title 4"/>
+          <p:cNvSpPr>
+            <a:spLocks noGrp="1"/>
+          </p:cNvSpPr>
+          <p:nvPr>
+            <p:ph type="title"/>
+          </p:nvPr>
+        </p:nvSpPr>
+        <p:spPr/>
+        <p:txBody>
+          <a:bodyPr/>
+          <a:lstStyle/>
+          <a:p>
+            <a:endParaRPr lang="en-GB"/>
+          </a:p>
+        </p:txBody>
+      </p:sp>
+      <p:pic>
+        <p:nvPicPr>
+          <p:cNvPr id="7" name="Chrome">
+            <a:hlinkClick r:id="" action="ppaction://media"/>
+          </p:cNvPr>
+          <p:cNvPicPr>
+            <a:picLocks noGrp="1" noChangeAspect="1"/>
+          </p:cNvPicPr>
+          <p:nvPr>
+            <p:ph idx="1"/>
+            <a:videoFile r:link="rId2"/>
+            <p:extLst>
+              <p:ext uri="{DAA4B4D4-6D71-4841-9C94-3DE7FCFB9230}">
+                <p14:media xmlns:p14="http://schemas.microsoft.com/office/powerpoint/2010/main" r:embed="rId1"/>
+              </p:ext>
+            </p:extLst>
+          </p:nvPr>
+        </p:nvPicPr>
+        <p:blipFill>
+          <a:blip r:embed="rId5"/>
+          <a:stretch>
+            <a:fillRect/>
+          </a:stretch>
+        </p:blipFill>
+        <p:spPr>
+          <a:xfrm>
+            <a:off x="0" y="-1"/>
+            <a:ext cx="12192000" cy="6857845"/>
+          </a:xfrm>
+        </p:spPr>
+      </p:pic>
+    </p:spTree>
+    <p:extLst>
+      <p:ext uri="{BB962C8B-B14F-4D97-AF65-F5344CB8AC3E}">
+        <p14:creationId xmlns:p14="http://schemas.microsoft.com/office/powerpoint/2010/main" val="1389851393"/>
+      </p:ext>
+    </p:extLst>
+  </p:cSld>
+  <p:clrMapOvr>
+    <a:masterClrMapping/>
+  </p:clrMapOvr>
+  <p:timing>
+    <p:tnLst>
+      <p:par>
+        <p:cTn id="1" dur="indefinite" restart="never" nodeType="tmRoot">
+          <p:childTnLst>
+            <p:seq concurrent="1" nextAc="seek">
+              <p:cTn id="2" restart="whenNotActive" fill="hold" evtFilter="cancelBubble" nodeType="interactiveSeq">
+                <p:stCondLst>
+                  <p:cond evt="onClick" delay="0">
+                    <p:tgtEl>
+                      <p:spTgt spid="7"/>
+                    </p:tgtEl>
+                  </p:cond>
+                </p:stCondLst>
+                <p:endSync evt="end" delay="0">
+                  <p:rtn val="all"/>
+                </p:endSync>
+                <p:childTnLst>
+                  <p:par>
+                    <p:cTn id="3" fill="hold">
+                      <p:stCondLst>
+                        <p:cond delay="0"/>
+                      </p:stCondLst>
+                      <p:childTnLst>
+                        <p:par>
+                          <p:cTn id="4" fill="hold">
+                            <p:stCondLst>
+                              <p:cond delay="0"/>
+                            </p:stCondLst>
+                            <p:childTnLst>
+                              <p:par>
+                                <p:cTn id="5" presetID="2" presetClass="mediacall" presetSubtype="0" fill="hold" nodeType="clickEffect">
+                                  <p:stCondLst>
+                                    <p:cond delay="0"/>
+                                  </p:stCondLst>
+                                  <p:childTnLst>
+                                    <p:cmd type="call" cmd="togglePause">
+                                      <p:cBhvr>
+                                        <p:cTn id="6" dur="1" fill="hold"/>
+                                        <p:tgtEl>
+                                          <p:spTgt spid="7"/>
+                                        </p:tgtEl>
+                                      </p:cBhvr>
+                                    </p:cmd>
+                                  </p:childTnLst>
+                                </p:cTn>
+                              </p:par>
+                            </p:childTnLst>
+                          </p:cTn>
+                        </p:par>
+                      </p:childTnLst>
+                    </p:cTn>
+                  </p:par>
+                </p:childTnLst>
+              </p:cTn>
+              <p:nextCondLst>
+                <p:cond evt="onClick" delay="0">
+                  <p:tgtEl>
+                    <p:spTgt spid="7"/>
+                  </p:tgtEl>
+                </p:cond>
+              </p:nextCondLst>
+            </p:seq>
+            <p:video>
+              <p:cMediaNode vol="80000">
+                <p:cTn id="7" fill="hold" display="0">
+                  <p:stCondLst>
+                    <p:cond delay="indefinite"/>
+                  </p:stCondLst>
+                </p:cTn>
+                <p:tgtEl>
+                  <p:spTgt spid="7"/>
+                </p:tgtEl>
+              </p:cMediaNode>
+            </p:video>
+          </p:childTnLst>
+        </p:cTn>
+      </p:par>
+    </p:tnLst>
+  </p:timing>
+</p:sld>
+</file>
+
+<file path=ppt/slides/slide12.xml><?xml version="1.0" encoding="utf-8"?>
+<p:sld xmlns:a="http://schemas.openxmlformats.org/drawingml/2006/main" xmlns:r="http://schemas.openxmlformats.org/officeDocument/2006/relationships" xmlns:p="http://schemas.openxmlformats.org/presentationml/2006/main">
+  <p:cSld>
+    <p:spTree>
+      <p:nvGrpSpPr>
+        <p:cNvPr id="1" name=""/>
+        <p:cNvGrpSpPr/>
+        <p:nvPr/>
+      </p:nvGrpSpPr>
+      <p:grpSpPr>
+        <a:xfrm>
+          <a:off x="0" y="0"/>
+          <a:ext cx="0" cy="0"/>
+          <a:chOff x="0" y="0"/>
+          <a:chExt cx="0" cy="0"/>
+        </a:xfrm>
+      </p:grpSpPr>
+      <p:sp>
+        <p:nvSpPr>
+          <p:cNvPr id="2" name="Title 1"/>
+          <p:cNvSpPr>
+            <a:spLocks noGrp="1"/>
+          </p:cNvSpPr>
+          <p:nvPr>
+            <p:ph type="title"/>
+          </p:nvPr>
+        </p:nvSpPr>
+        <p:spPr/>
+        <p:txBody>
+          <a:bodyPr/>
+          <a:lstStyle/>
+          <a:p>
+            <a:r>
+              <a:rPr lang="en-GB" dirty="0" smtClean="0"/>
+              <a:t>Console App</a:t>
+            </a:r>
+            <a:endParaRPr lang="en-GB" dirty="0"/>
+          </a:p>
+        </p:txBody>
+      </p:sp>
+      <p:pic>
+        <p:nvPicPr>
+          <p:cNvPr id="4" name="Console">
+            <a:hlinkClick r:id="" action="ppaction://media"/>
+          </p:cNvPr>
+          <p:cNvPicPr>
+            <a:picLocks noGrp="1" noChangeAspect="1"/>
+          </p:cNvPicPr>
+          <p:nvPr>
+            <p:ph idx="1"/>
+            <a:videoFile r:link="rId2"/>
+            <p:extLst>
+              <p:ext uri="{DAA4B4D4-6D71-4841-9C94-3DE7FCFB9230}">
+                <p14:media xmlns:p14="http://schemas.microsoft.com/office/powerpoint/2010/main" r:embed="rId1"/>
+              </p:ext>
+            </p:extLst>
+          </p:nvPr>
+        </p:nvPicPr>
+        <p:blipFill>
+          <a:blip r:embed="rId4"/>
+          <a:stretch>
+            <a:fillRect/>
+          </a:stretch>
+        </p:blipFill>
+        <p:spPr>
+          <a:xfrm>
+            <a:off x="0" y="-1"/>
+            <a:ext cx="12192000" cy="6857845"/>
+          </a:xfrm>
+        </p:spPr>
+      </p:pic>
+    </p:spTree>
+    <p:extLst>
+      <p:ext uri="{BB962C8B-B14F-4D97-AF65-F5344CB8AC3E}">
+        <p14:creationId xmlns:p14="http://schemas.microsoft.com/office/powerpoint/2010/main" val="4285267994"/>
+      </p:ext>
+    </p:extLst>
+  </p:cSld>
+  <p:clrMapOvr>
+    <a:masterClrMapping/>
+  </p:clrMapOvr>
+  <p:timing>
+    <p:tnLst>
+      <p:par>
+        <p:cTn id="1" dur="indefinite" restart="never" nodeType="tmRoot">
+          <p:childTnLst>
+            <p:seq concurrent="1" nextAc="seek">
+              <p:cTn id="2" restart="whenNotActive" fill="hold" evtFilter="cancelBubble" nodeType="interactiveSeq">
+                <p:stCondLst>
+                  <p:cond evt="onClick" delay="0">
+                    <p:tgtEl>
+                      <p:spTgt spid="4"/>
+                    </p:tgtEl>
+                  </p:cond>
+                </p:stCondLst>
+                <p:endSync evt="end" delay="0">
+                  <p:rtn val="all"/>
+                </p:endSync>
+                <p:childTnLst>
+                  <p:par>
+                    <p:cTn id="3" fill="hold">
+                      <p:stCondLst>
+                        <p:cond delay="0"/>
+                      </p:stCondLst>
+                      <p:childTnLst>
+                        <p:par>
+                          <p:cTn id="4" fill="hold">
+                            <p:stCondLst>
+                              <p:cond delay="0"/>
+                            </p:stCondLst>
+                            <p:childTnLst>
+                              <p:par>
+                                <p:cTn id="5" presetID="2" presetClass="mediacall" presetSubtype="0" fill="hold" nodeType="clickEffect">
+                                  <p:stCondLst>
+                                    <p:cond delay="0"/>
+                                  </p:stCondLst>
+                                  <p:childTnLst>
+                                    <p:cmd type="call" cmd="togglePause">
+                                      <p:cBhvr>
+                                        <p:cTn id="6" dur="1" fill="hold"/>
+                                        <p:tgtEl>
+                                          <p:spTgt spid="4"/>
+                                        </p:tgtEl>
+                                      </p:cBhvr>
+                                    </p:cmd>
+                                  </p:childTnLst>
+                                </p:cTn>
+                              </p:par>
+                            </p:childTnLst>
+                          </p:cTn>
+                        </p:par>
+                      </p:childTnLst>
+                    </p:cTn>
+                  </p:par>
+                </p:childTnLst>
+              </p:cTn>
+              <p:nextCondLst>
+                <p:cond evt="onClick" delay="0">
+                  <p:tgtEl>
+                    <p:spTgt spid="4"/>
+                  </p:tgtEl>
+                </p:cond>
+              </p:nextCondLst>
+            </p:seq>
+            <p:video>
+              <p:cMediaNode vol="80000">
+                <p:cTn id="7" fill="hold" display="0">
+                  <p:stCondLst>
+                    <p:cond delay="indefinite"/>
+                  </p:stCondLst>
+                </p:cTn>
+                <p:tgtEl>
+                  <p:spTgt spid="4"/>
+                </p:tgtEl>
+              </p:cMediaNode>
+            </p:video>
+          </p:childTnLst>
+        </p:cTn>
+      </p:par>
+    </p:tnLst>
+  </p:timing>
+</p:sld>
+</file>
+
 <file path=ppt/slides/slide2.xml><?xml version="1.0" encoding="utf-8"?>
 <p:sld xmlns:a="http://schemas.openxmlformats.org/drawingml/2006/main" xmlns:r="http://schemas.openxmlformats.org/officeDocument/2006/relationships" xmlns:p="http://schemas.openxmlformats.org/presentationml/2006/main">
   <p:cSld>
@@ -4250,32 +5468,137 @@
           <a:p>
             <a:r>
               <a:rPr lang="en-GB" dirty="0" smtClean="0"/>
-              <a:t>Quorum</a:t>
+              <a:t>Thanks Quorum (Dave’s employer)</a:t>
             </a:r>
             <a:endParaRPr lang="en-GB" dirty="0"/>
           </a:p>
         </p:txBody>
       </p:sp>
-      <p:sp>
-        <p:nvSpPr>
-          <p:cNvPr id="3" name="Content Placeholder 2"/>
-          <p:cNvSpPr>
-            <a:spLocks noGrp="1"/>
-          </p:cNvSpPr>
-          <p:nvPr>
-            <p:ph idx="1"/>
-          </p:nvPr>
-        </p:nvSpPr>
-        <p:spPr/>
-        <p:txBody>
-          <a:bodyPr/>
-          <a:lstStyle/>
-          <a:p>
-            <a:r>
-              <a:rPr lang="en-GB" dirty="0" smtClean="0"/>
-              <a:t>Logos here</a:t>
-            </a:r>
-            <a:endParaRPr lang="en-GB" dirty="0"/>
+      <p:pic>
+        <p:nvPicPr>
+          <p:cNvPr id="1026" name="Picture 2" descr="http://www.logotypes101.com/logos/659/F7F9770609B3542CB3D6D7F7AC4708CA/RBS_Group.png"/>
+          <p:cNvPicPr>
+            <a:picLocks noChangeAspect="1" noChangeArrowheads="1"/>
+          </p:cNvPicPr>
+          <p:nvPr/>
+        </p:nvPicPr>
+        <p:blipFill>
+          <a:blip r:embed="rId3">
+            <a:extLst>
+              <a:ext uri="{28A0092B-C50C-407E-A947-70E740481C1C}">
+                <a14:useLocalDpi xmlns:a14="http://schemas.microsoft.com/office/drawing/2010/main" val="0"/>
+              </a:ext>
+            </a:extLst>
+          </a:blip>
+          <a:srcRect/>
+          <a:stretch>
+            <a:fillRect/>
+          </a:stretch>
+        </p:blipFill>
+        <p:spPr bwMode="auto">
+          <a:xfrm>
+            <a:off x="838200" y="2449286"/>
+            <a:ext cx="1872343" cy="1872343"/>
+          </a:xfrm>
+          <a:prstGeom prst="rect">
+            <a:avLst/>
+          </a:prstGeom>
+          <a:noFill/>
+          <a:extLst>
+            <a:ext uri="{909E8E84-426E-40DD-AFC4-6F175D3DCCD1}">
+              <a14:hiddenFill xmlns:a14="http://schemas.microsoft.com/office/drawing/2010/main">
+                <a:solidFill>
+                  <a:srgbClr val="FFFFFF"/>
+                </a:solidFill>
+              </a14:hiddenFill>
+            </a:ext>
+          </a:extLst>
+        </p:spPr>
+      </p:pic>
+      <p:pic>
+        <p:nvPicPr>
+          <p:cNvPr id="1028" name="Picture 4" descr="File:Lloyds Bank official new logo.png"/>
+          <p:cNvPicPr>
+            <a:picLocks noChangeAspect="1" noChangeArrowheads="1"/>
+          </p:cNvPicPr>
+          <p:nvPr/>
+        </p:nvPicPr>
+        <p:blipFill>
+          <a:blip r:embed="rId4">
+            <a:extLst>
+              <a:ext uri="{28A0092B-C50C-407E-A947-70E740481C1C}">
+                <a14:useLocalDpi xmlns:a14="http://schemas.microsoft.com/office/drawing/2010/main" val="0"/>
+              </a:ext>
+            </a:extLst>
+          </a:blip>
+          <a:srcRect/>
+          <a:stretch>
+            <a:fillRect/>
+          </a:stretch>
+        </p:blipFill>
+        <p:spPr bwMode="auto">
+          <a:xfrm>
+            <a:off x="3062061" y="2449286"/>
+            <a:ext cx="3180139" cy="1719263"/>
+          </a:xfrm>
+          <a:prstGeom prst="rect">
+            <a:avLst/>
+          </a:prstGeom>
+          <a:noFill/>
+          <a:extLst>
+            <a:ext uri="{909E8E84-426E-40DD-AFC4-6F175D3DCCD1}">
+              <a14:hiddenFill xmlns:a14="http://schemas.microsoft.com/office/drawing/2010/main">
+                <a:solidFill>
+                  <a:srgbClr val="FFFFFF"/>
+                </a:solidFill>
+              </a14:hiddenFill>
+            </a:ext>
+          </a:extLst>
+        </p:spPr>
+      </p:pic>
+      <p:sp>
+        <p:nvSpPr>
+          <p:cNvPr id="5" name="TextBox 4"/>
+          <p:cNvSpPr txBox="1"/>
+          <p:nvPr/>
+        </p:nvSpPr>
+        <p:spPr>
+          <a:xfrm>
+            <a:off x="303164" y="5295130"/>
+            <a:ext cx="11585672" cy="707886"/>
+          </a:xfrm>
+          <a:prstGeom prst="rect">
+            <a:avLst/>
+          </a:prstGeom>
+          <a:noFill/>
+        </p:spPr>
+        <p:txBody>
+          <a:bodyPr wrap="none" rtlCol="0">
+            <a:spAutoFit/>
+          </a:bodyPr>
+          <a:lstStyle/>
+          <a:p>
+            <a:r>
+              <a:rPr lang="en-GB" sz="4000" dirty="0" smtClean="0">
+                <a:solidFill>
+                  <a:schemeClr val="tx1">
+                    <a:lumMod val="75000"/>
+                    <a:lumOff val="25000"/>
+                  </a:schemeClr>
+                </a:solidFill>
+                <a:latin typeface="Montserrat" panose="00000500000000000000" pitchFamily="50" charset="0"/>
+              </a:rPr>
+              <a:t>We do Infrastructure and Software for clients</a:t>
+            </a:r>
+            <a:endParaRPr lang="en-GB" sz="4000" dirty="0">
+              <a:solidFill>
+                <a:schemeClr val="tx1">
+                  <a:lumMod val="75000"/>
+                  <a:lumOff val="25000"/>
+                </a:schemeClr>
+              </a:solidFill>
+              <a:latin typeface="Montserrat" panose="00000500000000000000" pitchFamily="50" charset="0"/>
+            </a:endParaRPr>
           </a:p>
         </p:txBody>
       </p:sp>
@@ -4333,35 +5656,157 @@
           <a:p>
             <a:r>
               <a:rPr lang="en-GB" dirty="0" smtClean="0"/>
-              <a:t>Test</a:t>
+              <a:t>What’s in this talk for me?</a:t>
             </a:r>
             <a:endParaRPr lang="en-GB" dirty="0"/>
           </a:p>
         </p:txBody>
       </p:sp>
-      <p:sp>
-        <p:nvSpPr>
-          <p:cNvPr id="5" name="Content Placeholder 4"/>
-          <p:cNvSpPr>
-            <a:spLocks noGrp="1"/>
-          </p:cNvSpPr>
+      <p:pic>
+        <p:nvPicPr>
+          <p:cNvPr id="7" name="Content Placeholder 6"/>
+          <p:cNvPicPr>
+            <a:picLocks noGrp="1" noChangeAspect="1"/>
+          </p:cNvPicPr>
           <p:nvPr>
             <p:ph idx="1"/>
           </p:nvPr>
-        </p:nvSpPr>
-        <p:spPr/>
-        <p:txBody>
-          <a:bodyPr/>
-          <a:lstStyle/>
-          <a:p>
-            <a:r>
-              <a:rPr lang="en-GB" dirty="0" err="1" smtClean="0"/>
-              <a:t>asdfasdfasdf</a:t>
-            </a:r>
-            <a:endParaRPr lang="en-GB" dirty="0"/>
-          </a:p>
-        </p:txBody>
-      </p:sp>
+        </p:nvPicPr>
+        <p:blipFill>
+          <a:blip r:embed="rId3">
+            <a:extLst>
+              <a:ext uri="{28A0092B-C50C-407E-A947-70E740481C1C}">
+                <a14:useLocalDpi xmlns:a14="http://schemas.microsoft.com/office/drawing/2010/main" val="0"/>
+              </a:ext>
+            </a:extLst>
+          </a:blip>
+          <a:stretch>
+            <a:fillRect/>
+          </a:stretch>
+        </p:blipFill>
+        <p:spPr>
+          <a:xfrm>
+            <a:off x="838200" y="2049258"/>
+            <a:ext cx="2571750" cy="476250"/>
+          </a:xfrm>
+          <a:prstGeom prst="rect">
+            <a:avLst/>
+          </a:prstGeom>
+        </p:spPr>
+      </p:pic>
+      <p:pic>
+        <p:nvPicPr>
+          <p:cNvPr id="2050" name="Picture 2" descr="http://oauth.net/images/oauth-2-sm.png"/>
+          <p:cNvPicPr>
+            <a:picLocks noChangeAspect="1" noChangeArrowheads="1"/>
+          </p:cNvPicPr>
+          <p:nvPr/>
+        </p:nvPicPr>
+        <p:blipFill>
+          <a:blip r:embed="rId4">
+            <a:extLst>
+              <a:ext uri="{28A0092B-C50C-407E-A947-70E740481C1C}">
+                <a14:useLocalDpi xmlns:a14="http://schemas.microsoft.com/office/drawing/2010/main" val="0"/>
+              </a:ext>
+            </a:extLst>
+          </a:blip>
+          <a:srcRect/>
+          <a:stretch>
+            <a:fillRect/>
+          </a:stretch>
+        </p:blipFill>
+        <p:spPr bwMode="auto">
+          <a:xfrm>
+            <a:off x="1533525" y="3074624"/>
+            <a:ext cx="1181100" cy="1171575"/>
+          </a:xfrm>
+          <a:prstGeom prst="rect">
+            <a:avLst/>
+          </a:prstGeom>
+          <a:noFill/>
+          <a:extLst>
+            <a:ext uri="{909E8E84-426E-40DD-AFC4-6F175D3DCCD1}">
+              <a14:hiddenFill xmlns:a14="http://schemas.microsoft.com/office/drawing/2010/main">
+                <a:solidFill>
+                  <a:srgbClr val="FFFFFF"/>
+                </a:solidFill>
+              </a14:hiddenFill>
+            </a:ext>
+          </a:extLst>
+        </p:spPr>
+      </p:pic>
+      <p:pic>
+        <p:nvPicPr>
+          <p:cNvPr id="2" name="Picture 1"/>
+          <p:cNvPicPr>
+            <a:picLocks noChangeAspect="1"/>
+          </p:cNvPicPr>
+          <p:nvPr/>
+        </p:nvPicPr>
+        <p:blipFill>
+          <a:blip r:embed="rId5"/>
+          <a:stretch>
+            <a:fillRect/>
+          </a:stretch>
+        </p:blipFill>
+        <p:spPr>
+          <a:xfrm>
+            <a:off x="4773898" y="1990633"/>
+            <a:ext cx="4242815" cy="716144"/>
+          </a:xfrm>
+          <a:prstGeom prst="rect">
+            <a:avLst/>
+          </a:prstGeom>
+        </p:spPr>
+      </p:pic>
+      <p:pic>
+        <p:nvPicPr>
+          <p:cNvPr id="8" name="Picture 7"/>
+          <p:cNvPicPr>
+            <a:picLocks noChangeAspect="1"/>
+          </p:cNvPicPr>
+          <p:nvPr/>
+        </p:nvPicPr>
+        <p:blipFill>
+          <a:blip r:embed="rId6"/>
+          <a:stretch>
+            <a:fillRect/>
+          </a:stretch>
+        </p:blipFill>
+        <p:spPr>
+          <a:xfrm>
+            <a:off x="8384993" y="3660411"/>
+            <a:ext cx="2266950" cy="590550"/>
+          </a:xfrm>
+          <a:prstGeom prst="rect">
+            <a:avLst/>
+          </a:prstGeom>
+        </p:spPr>
+      </p:pic>
+      <p:pic>
+        <p:nvPicPr>
+          <p:cNvPr id="9" name="Picture 8"/>
+          <p:cNvPicPr>
+            <a:picLocks noChangeAspect="1"/>
+          </p:cNvPicPr>
+          <p:nvPr/>
+        </p:nvPicPr>
+        <p:blipFill>
+          <a:blip r:embed="rId7"/>
+          <a:stretch>
+            <a:fillRect/>
+          </a:stretch>
+        </p:blipFill>
+        <p:spPr>
+          <a:xfrm>
+            <a:off x="3409950" y="3660411"/>
+            <a:ext cx="2722244" cy="777784"/>
+          </a:xfrm>
+          <a:prstGeom prst="rect">
+            <a:avLst/>
+          </a:prstGeom>
+        </p:spPr>
+      </p:pic>
     </p:spTree>
     <p:extLst>
       <p:ext uri="{BB962C8B-B14F-4D97-AF65-F5344CB8AC3E}">
@@ -4401,7 +5846,7 @@
       </p:grpSpPr>
       <p:sp>
         <p:nvSpPr>
-          <p:cNvPr id="2" name="Title 1"/>
+          <p:cNvPr id="4" name="Title 3"/>
           <p:cNvSpPr>
             <a:spLocks noGrp="1"/>
           </p:cNvSpPr>
@@ -4416,35 +5861,59 @@
           <a:p>
             <a:r>
               <a:rPr lang="en-GB" dirty="0" smtClean="0"/>
-              <a:t>The Basics</a:t>
+              <a:t>MUSIC!</a:t>
             </a:r>
             <a:endParaRPr lang="en-GB" dirty="0"/>
           </a:p>
         </p:txBody>
       </p:sp>
-      <p:sp>
-        <p:nvSpPr>
-          <p:cNvPr id="3" name="Content Placeholder 2"/>
-          <p:cNvSpPr>
-            <a:spLocks noGrp="1"/>
-          </p:cNvSpPr>
+      <p:pic>
+        <p:nvPicPr>
+          <p:cNvPr id="3076" name="Picture 4" descr="http://i.dailymail.co.uk/i/pix/2012/08/15/article-1352463-148DBC4A000005DC-74_470x468.jpg"/>
+          <p:cNvPicPr>
+            <a:picLocks noGrp="1" noChangeAspect="1" noChangeArrowheads="1"/>
+          </p:cNvPicPr>
           <p:nvPr>
             <p:ph idx="1"/>
           </p:nvPr>
-        </p:nvSpPr>
-        <p:spPr/>
-        <p:txBody>
-          <a:bodyPr/>
-          <a:lstStyle/>
-          <a:p>
-            <a:endParaRPr lang="en-GB" dirty="0"/>
-          </a:p>
-        </p:txBody>
-      </p:sp>
+        </p:nvPicPr>
+        <p:blipFill>
+          <a:blip r:embed="rId3">
+            <a:extLst>
+              <a:ext uri="{28A0092B-C50C-407E-A947-70E740481C1C}">
+                <a14:useLocalDpi xmlns:a14="http://schemas.microsoft.com/office/drawing/2010/main" val="0"/>
+              </a:ext>
+            </a:extLst>
+          </a:blip>
+          <a:srcRect/>
+          <a:stretch>
+            <a:fillRect/>
+          </a:stretch>
+        </p:blipFill>
+        <p:spPr bwMode="auto">
+          <a:xfrm>
+            <a:off x="5277394" y="0"/>
+            <a:ext cx="6914606" cy="6885183"/>
+          </a:xfrm>
+          <a:prstGeom prst="rect">
+            <a:avLst/>
+          </a:prstGeom>
+          <a:noFill/>
+          <a:extLst>
+            <a:ext uri="{909E8E84-426E-40DD-AFC4-6F175D3DCCD1}">
+              <a14:hiddenFill xmlns:a14="http://schemas.microsoft.com/office/drawing/2010/main">
+                <a:solidFill>
+                  <a:srgbClr val="FFFFFF"/>
+                </a:solidFill>
+              </a14:hiddenFill>
+            </a:ext>
+          </a:extLst>
+        </p:spPr>
+      </p:pic>
     </p:spTree>
     <p:extLst>
       <p:ext uri="{BB962C8B-B14F-4D97-AF65-F5344CB8AC3E}">
-        <p14:creationId xmlns:p14="http://schemas.microsoft.com/office/powerpoint/2010/main" val="2284720730"/>
+        <p14:creationId xmlns:p14="http://schemas.microsoft.com/office/powerpoint/2010/main" val="1900385683"/>
       </p:ext>
     </p:extLst>
   </p:cSld>
@@ -4495,7 +5964,7 @@
           <a:p>
             <a:r>
               <a:rPr lang="en-GB" dirty="0" smtClean="0"/>
-              <a:t>Quorum</a:t>
+              <a:t>The Final Demo</a:t>
             </a:r>
             <a:endParaRPr lang="en-GB" dirty="0"/>
           </a:p>
@@ -4516,14 +5985,14 @@
           <a:bodyPr/>
           <a:lstStyle/>
           <a:p>
-            <a:endParaRPr lang="en-GB"/>
+            <a:endParaRPr lang="en-GB" dirty="0"/>
           </a:p>
         </p:txBody>
       </p:sp>
     </p:spTree>
     <p:extLst>
       <p:ext uri="{BB962C8B-B14F-4D97-AF65-F5344CB8AC3E}">
-        <p14:creationId xmlns:p14="http://schemas.microsoft.com/office/powerpoint/2010/main" val="2406421896"/>
+        <p14:creationId xmlns:p14="http://schemas.microsoft.com/office/powerpoint/2010/main" val="2284720730"/>
       </p:ext>
     </p:extLst>
   </p:cSld>
@@ -4574,7 +6043,7 @@
           <a:p>
             <a:r>
               <a:rPr lang="en-GB" dirty="0" smtClean="0"/>
-              <a:t>Prologue</a:t>
+              <a:t>What is Spotify?</a:t>
             </a:r>
             <a:endParaRPr lang="en-GB" dirty="0"/>
           </a:p>
@@ -4592,10 +6061,402 @@
         </p:nvSpPr>
         <p:spPr/>
         <p:txBody>
-          <a:bodyPr/>
-          <a:lstStyle/>
-          <a:p>
-            <a:endParaRPr lang="en-GB"/>
+          <a:bodyPr>
+            <a:normAutofit/>
+          </a:bodyPr>
+          <a:lstStyle/>
+          <a:p>
+            <a:pPr marL="0" indent="0">
+              <a:buNone/>
+            </a:pPr>
+            <a:r>
+              <a:rPr lang="en-GB" sz="5400" dirty="0" smtClean="0"/>
+              <a:t>Music streaming service</a:t>
+            </a:r>
+          </a:p>
+          <a:p>
+            <a:pPr marL="0" indent="0">
+              <a:buNone/>
+            </a:pPr>
+            <a:r>
+              <a:rPr lang="en-GB" sz="5400" dirty="0" smtClean="0"/>
+              <a:t>2008, Sweden, 60m (15m paid) Users, 38m tracks</a:t>
+            </a:r>
+            <a:endParaRPr lang="en-GB" sz="5400" dirty="0" smtClean="0"/>
+          </a:p>
+          <a:p>
+            <a:pPr marL="0" indent="0">
+              <a:buNone/>
+            </a:pPr>
+            <a:endParaRPr lang="en-GB" sz="5400" dirty="0"/>
+          </a:p>
+        </p:txBody>
+      </p:sp>
+    </p:spTree>
+    <p:extLst>
+      <p:ext uri="{BB962C8B-B14F-4D97-AF65-F5344CB8AC3E}">
+        <p14:creationId xmlns:p14="http://schemas.microsoft.com/office/powerpoint/2010/main" val="2406421896"/>
+      </p:ext>
+    </p:extLst>
+  </p:cSld>
+  <p:clrMapOvr>
+    <a:masterClrMapping/>
+  </p:clrMapOvr>
+  <p:timing>
+    <p:tnLst>
+      <p:par>
+        <p:cTn id="1" dur="indefinite" restart="never" nodeType="tmRoot"/>
+      </p:par>
+    </p:tnLst>
+  </p:timing>
+</p:sld>
+</file>
+
+<file path=ppt/slides/slide7.xml><?xml version="1.0" encoding="utf-8"?>
+<p:sld xmlns:a="http://schemas.openxmlformats.org/drawingml/2006/main" xmlns:r="http://schemas.openxmlformats.org/officeDocument/2006/relationships" xmlns:p="http://schemas.openxmlformats.org/presentationml/2006/main">
+  <p:cSld>
+    <p:spTree>
+      <p:nvGrpSpPr>
+        <p:cNvPr id="1" name=""/>
+        <p:cNvGrpSpPr/>
+        <p:nvPr/>
+      </p:nvGrpSpPr>
+      <p:grpSpPr>
+        <a:xfrm>
+          <a:off x="0" y="0"/>
+          <a:ext cx="0" cy="0"/>
+          <a:chOff x="0" y="0"/>
+          <a:chExt cx="0" cy="0"/>
+        </a:xfrm>
+      </p:grpSpPr>
+      <p:sp>
+        <p:nvSpPr>
+          <p:cNvPr id="2" name="Title 1"/>
+          <p:cNvSpPr>
+            <a:spLocks noGrp="1"/>
+          </p:cNvSpPr>
+          <p:nvPr>
+            <p:ph type="title"/>
+          </p:nvPr>
+        </p:nvSpPr>
+        <p:spPr/>
+        <p:txBody>
+          <a:bodyPr/>
+          <a:lstStyle/>
+          <a:p>
+            <a:r>
+              <a:rPr lang="en-GB" dirty="0" smtClean="0"/>
+              <a:t>What is Spotify?</a:t>
+            </a:r>
+            <a:endParaRPr lang="en-GB" dirty="0"/>
+          </a:p>
+        </p:txBody>
+      </p:sp>
+      <p:pic>
+        <p:nvPicPr>
+          <p:cNvPr id="4" name="Content Placeholder 3"/>
+          <p:cNvPicPr>
+            <a:picLocks noGrp="1" noChangeAspect="1"/>
+          </p:cNvPicPr>
+          <p:nvPr>
+            <p:ph idx="1"/>
+          </p:nvPr>
+        </p:nvPicPr>
+        <p:blipFill>
+          <a:blip r:embed="rId3"/>
+          <a:stretch>
+            <a:fillRect/>
+          </a:stretch>
+        </p:blipFill>
+        <p:spPr>
+          <a:xfrm>
+            <a:off x="877389" y="-2097"/>
+            <a:ext cx="10476411" cy="6860097"/>
+          </a:xfrm>
+          <a:prstGeom prst="rect">
+            <a:avLst/>
+          </a:prstGeom>
+        </p:spPr>
+      </p:pic>
+    </p:spTree>
+    <p:extLst>
+      <p:ext uri="{BB962C8B-B14F-4D97-AF65-F5344CB8AC3E}">
+        <p14:creationId xmlns:p14="http://schemas.microsoft.com/office/powerpoint/2010/main" val="2867505721"/>
+      </p:ext>
+    </p:extLst>
+  </p:cSld>
+  <p:clrMapOvr>
+    <a:masterClrMapping/>
+  </p:clrMapOvr>
+  <p:timing>
+    <p:tnLst>
+      <p:par>
+        <p:cTn id="1" dur="indefinite" restart="never" nodeType="tmRoot"/>
+      </p:par>
+    </p:tnLst>
+  </p:timing>
+</p:sld>
+</file>
+
+<file path=ppt/slides/slide8.xml><?xml version="1.0" encoding="utf-8"?>
+<p:sld xmlns:a="http://schemas.openxmlformats.org/drawingml/2006/main" xmlns:r="http://schemas.openxmlformats.org/officeDocument/2006/relationships" xmlns:p="http://schemas.openxmlformats.org/presentationml/2006/main">
+  <p:cSld>
+    <p:spTree>
+      <p:nvGrpSpPr>
+        <p:cNvPr id="1" name=""/>
+        <p:cNvGrpSpPr/>
+        <p:nvPr/>
+      </p:nvGrpSpPr>
+      <p:grpSpPr>
+        <a:xfrm>
+          <a:off x="0" y="0"/>
+          <a:ext cx="0" cy="0"/>
+          <a:chOff x="0" y="0"/>
+          <a:chExt cx="0" cy="0"/>
+        </a:xfrm>
+      </p:grpSpPr>
+      <p:sp>
+        <p:nvSpPr>
+          <p:cNvPr id="2" name="Title 1"/>
+          <p:cNvSpPr>
+            <a:spLocks noGrp="1"/>
+          </p:cNvSpPr>
+          <p:nvPr>
+            <p:ph type="title"/>
+          </p:nvPr>
+        </p:nvSpPr>
+        <p:spPr/>
+        <p:txBody>
+          <a:bodyPr/>
+          <a:lstStyle/>
+          <a:p>
+            <a:r>
+              <a:rPr lang="en-GB" dirty="0" smtClean="0"/>
+              <a:t>There is a Web API to do stuff</a:t>
+            </a:r>
+            <a:endParaRPr lang="en-GB" dirty="0"/>
+          </a:p>
+        </p:txBody>
+      </p:sp>
+      <p:sp>
+        <p:nvSpPr>
+          <p:cNvPr id="3" name="Content Placeholder 2"/>
+          <p:cNvSpPr>
+            <a:spLocks noGrp="1"/>
+          </p:cNvSpPr>
+          <p:nvPr>
+            <p:ph idx="1"/>
+          </p:nvPr>
+        </p:nvSpPr>
+        <p:spPr/>
+        <p:txBody>
+          <a:bodyPr>
+            <a:normAutofit/>
+          </a:bodyPr>
+          <a:lstStyle/>
+          <a:p>
+            <a:pPr marL="0" indent="0">
+              <a:buNone/>
+            </a:pPr>
+            <a:r>
+              <a:rPr lang="en-GB" sz="4800" dirty="0" smtClean="0"/>
+              <a:t>Explore Spotify catalogue</a:t>
+            </a:r>
+          </a:p>
+          <a:p>
+            <a:pPr marL="0" indent="0">
+              <a:buNone/>
+            </a:pPr>
+            <a:endParaRPr lang="en-GB" sz="4800" dirty="0" smtClean="0"/>
+          </a:p>
+          <a:p>
+            <a:pPr marL="0" indent="0">
+              <a:buNone/>
+            </a:pPr>
+            <a:r>
+              <a:rPr lang="en-GB" sz="4800" dirty="0" smtClean="0"/>
+              <a:t>Create and add tracks to playlists</a:t>
+            </a:r>
+            <a:endParaRPr lang="en-GB" sz="4800" dirty="0"/>
+          </a:p>
+        </p:txBody>
+      </p:sp>
+    </p:spTree>
+    <p:extLst>
+      <p:ext uri="{BB962C8B-B14F-4D97-AF65-F5344CB8AC3E}">
+        <p14:creationId xmlns:p14="http://schemas.microsoft.com/office/powerpoint/2010/main" val="1063986736"/>
+      </p:ext>
+    </p:extLst>
+  </p:cSld>
+  <p:clrMapOvr>
+    <a:masterClrMapping/>
+  </p:clrMapOvr>
+  <p:timing>
+    <p:tnLst>
+      <p:par>
+        <p:cTn id="1" dur="indefinite" restart="never" nodeType="tmRoot"/>
+      </p:par>
+    </p:tnLst>
+  </p:timing>
+</p:sld>
+</file>
+
+<file path=ppt/slides/slide9.xml><?xml version="1.0" encoding="utf-8"?>
+<p:sld xmlns:a="http://schemas.openxmlformats.org/drawingml/2006/main" xmlns:r="http://schemas.openxmlformats.org/officeDocument/2006/relationships" xmlns:p="http://schemas.openxmlformats.org/presentationml/2006/main">
+  <p:cSld>
+    <p:spTree>
+      <p:nvGrpSpPr>
+        <p:cNvPr id="1" name=""/>
+        <p:cNvGrpSpPr/>
+        <p:nvPr/>
+      </p:nvGrpSpPr>
+      <p:grpSpPr>
+        <a:xfrm>
+          <a:off x="0" y="0"/>
+          <a:ext cx="0" cy="0"/>
+          <a:chOff x="0" y="0"/>
+          <a:chExt cx="0" cy="0"/>
+        </a:xfrm>
+      </p:grpSpPr>
+      <p:sp>
+        <p:nvSpPr>
+          <p:cNvPr id="3" name="Content Placeholder 2"/>
+          <p:cNvSpPr>
+            <a:spLocks noGrp="1"/>
+          </p:cNvSpPr>
+          <p:nvPr>
+            <p:ph idx="1"/>
+          </p:nvPr>
+        </p:nvSpPr>
+        <p:spPr>
+          <a:xfrm>
+            <a:off x="838200" y="3030583"/>
+            <a:ext cx="10515600" cy="3146380"/>
+          </a:xfrm>
+        </p:spPr>
+        <p:txBody>
+          <a:bodyPr>
+            <a:normAutofit/>
+          </a:bodyPr>
+          <a:lstStyle/>
+          <a:p>
+            <a:pPr marL="0" indent="0">
+              <a:buNone/>
+            </a:pPr>
+            <a:r>
+              <a:rPr lang="en-GB" sz="6000" dirty="0"/>
+              <a:t> </a:t>
+            </a:r>
+            <a:r>
+              <a:rPr lang="en-GB" sz="4800" dirty="0"/>
+              <a:t>iframe </a:t>
+            </a:r>
+            <a:r>
+              <a:rPr lang="en-GB" sz="4800" dirty="0" err="1"/>
+              <a:t>src</a:t>
+            </a:r>
+            <a:r>
+              <a:rPr lang="en-GB" sz="4800" dirty="0"/>
+              <a:t>="</a:t>
+            </a:r>
+            <a:r>
+              <a:rPr lang="en-GB" sz="4800" u="sng" dirty="0">
+                <a:hlinkClick r:id="rId3"/>
+              </a:rPr>
+              <a:t>https://embed.spotify.com/?</a:t>
+            </a:r>
+            <a:r>
+              <a:rPr lang="en-GB" sz="4800" u="sng" dirty="0" err="1">
+                <a:hlinkClick r:id="rId3"/>
+              </a:rPr>
+              <a:t>uri</a:t>
+            </a:r>
+            <a:r>
+              <a:rPr lang="en-GB" sz="4800" u="sng" dirty="0">
+                <a:hlinkClick r:id="rId3"/>
+              </a:rPr>
+              <a:t>=spotify:track:0mDHS1Q7HGtpgjYAyG2Svn</a:t>
+            </a:r>
+            <a:r>
+              <a:rPr lang="en-GB" sz="4800" u="sng" dirty="0" smtClean="0">
+                <a:hlinkClick r:id="rId3"/>
+              </a:rPr>
+              <a:t>"</a:t>
+            </a:r>
+            <a:r>
+              <a:rPr lang="en-GB" sz="4800" dirty="0" smtClean="0"/>
+              <a:t>&gt;</a:t>
+            </a:r>
+            <a:endParaRPr lang="en-GB" sz="4800" dirty="0"/>
+          </a:p>
+        </p:txBody>
+      </p:sp>
+      <p:pic>
+        <p:nvPicPr>
+          <p:cNvPr id="4098" name="Picture 2" descr="image"/>
+          <p:cNvPicPr>
+            <a:picLocks noChangeAspect="1" noChangeArrowheads="1"/>
+          </p:cNvPicPr>
+          <p:nvPr/>
+        </p:nvPicPr>
+        <p:blipFill>
+          <a:blip r:embed="rId4">
+            <a:extLst>
+              <a:ext uri="{28A0092B-C50C-407E-A947-70E740481C1C}">
+                <a14:useLocalDpi xmlns:a14="http://schemas.microsoft.com/office/drawing/2010/main" val="0"/>
+              </a:ext>
+            </a:extLst>
+          </a:blip>
+          <a:srcRect/>
+          <a:stretch>
+            <a:fillRect/>
+          </a:stretch>
+        </p:blipFill>
+        <p:spPr bwMode="auto">
+          <a:xfrm>
+            <a:off x="6096000" y="0"/>
+            <a:ext cx="6126176" cy="2435406"/>
+          </a:xfrm>
+          <a:prstGeom prst="rect">
+            <a:avLst/>
+          </a:prstGeom>
+          <a:noFill/>
+          <a:extLst>
+            <a:ext uri="{909E8E84-426E-40DD-AFC4-6F175D3DCCD1}">
+              <a14:hiddenFill xmlns:a14="http://schemas.microsoft.com/office/drawing/2010/main">
+                <a:solidFill>
+                  <a:srgbClr val="FFFFFF"/>
+                </a:solidFill>
+              </a14:hiddenFill>
+            </a:ext>
+          </a:extLst>
+        </p:spPr>
+      </p:pic>
+      <p:sp>
+        <p:nvSpPr>
+          <p:cNvPr id="4" name="Title 3"/>
+          <p:cNvSpPr>
+            <a:spLocks noGrp="1"/>
+          </p:cNvSpPr>
+          <p:nvPr>
+            <p:ph type="title"/>
+          </p:nvPr>
+        </p:nvSpPr>
+        <p:spPr>
+          <a:xfrm>
+            <a:off x="838200" y="365125"/>
+            <a:ext cx="4389424" cy="1460500"/>
+          </a:xfrm>
+        </p:spPr>
+        <p:txBody>
+          <a:bodyPr/>
+          <a:lstStyle/>
+          <a:p>
+            <a:r>
+              <a:rPr lang="en-GB" dirty="0" smtClean="0"/>
+              <a:t>Embed</a:t>
+            </a:r>
+            <a:endParaRPr lang="en-GB" dirty="0"/>
           </a:p>
         </p:txBody>
       </p:sp>

</xml_diff>